<commit_message>
saving clean_data1 and adding new explor notebook
</commit_message>
<xml_diff>
--- a/Outline.pptx
+++ b/Outline.pptx
@@ -7,8 +7,8 @@
   <p:sldIdLst>
     <p:sldId id="256" r:id="rId2"/>
     <p:sldId id="257" r:id="rId3"/>
-    <p:sldId id="258" r:id="rId4"/>
-    <p:sldId id="259" r:id="rId5"/>
+    <p:sldId id="259" r:id="rId4"/>
+    <p:sldId id="258" r:id="rId5"/>
   </p:sldIdLst>
   <p:sldSz cx="12192000" cy="6858000"/>
   <p:notesSz cx="6858000" cy="9144000"/>
@@ -107,6 +107,11 @@
       </a:defRPr>
     </a:lvl9pPr>
   </p:defaultTextStyle>
+  <p:extLst>
+    <p:ext uri="{EFAFB233-063F-42B5-8137-9DF3F51BA10A}">
+      <p15:sldGuideLst xmlns:p15="http://schemas.microsoft.com/office/powerpoint/2012/main"/>
+    </p:ext>
+  </p:extLst>
 </p:presentation>
 </file>
 
@@ -241,7 +246,7 @@
           <a:p>
             <a:fld id="{F34933A6-C97B-4F74-B772-E8FCE02EB401}" type="datetimeFigureOut">
               <a:rPr lang="en-US" smtClean="0"/>
-              <a:t>3/3/2023</a:t>
+              <a:t>3/4/2023</a:t>
             </a:fld>
             <a:endParaRPr lang="en-US"/>
           </a:p>
@@ -411,7 +416,7 @@
           <a:p>
             <a:fld id="{F34933A6-C97B-4F74-B772-E8FCE02EB401}" type="datetimeFigureOut">
               <a:rPr lang="en-US" smtClean="0"/>
-              <a:t>3/3/2023</a:t>
+              <a:t>3/4/2023</a:t>
             </a:fld>
             <a:endParaRPr lang="en-US"/>
           </a:p>
@@ -591,7 +596,7 @@
           <a:p>
             <a:fld id="{F34933A6-C97B-4F74-B772-E8FCE02EB401}" type="datetimeFigureOut">
               <a:rPr lang="en-US" smtClean="0"/>
-              <a:t>3/3/2023</a:t>
+              <a:t>3/4/2023</a:t>
             </a:fld>
             <a:endParaRPr lang="en-US"/>
           </a:p>
@@ -761,7 +766,7 @@
           <a:p>
             <a:fld id="{F34933A6-C97B-4F74-B772-E8FCE02EB401}" type="datetimeFigureOut">
               <a:rPr lang="en-US" smtClean="0"/>
-              <a:t>3/3/2023</a:t>
+              <a:t>3/4/2023</a:t>
             </a:fld>
             <a:endParaRPr lang="en-US"/>
           </a:p>
@@ -1007,7 +1012,7 @@
           <a:p>
             <a:fld id="{F34933A6-C97B-4F74-B772-E8FCE02EB401}" type="datetimeFigureOut">
               <a:rPr lang="en-US" smtClean="0"/>
-              <a:t>3/3/2023</a:t>
+              <a:t>3/4/2023</a:t>
             </a:fld>
             <a:endParaRPr lang="en-US"/>
           </a:p>
@@ -1239,7 +1244,7 @@
           <a:p>
             <a:fld id="{F34933A6-C97B-4F74-B772-E8FCE02EB401}" type="datetimeFigureOut">
               <a:rPr lang="en-US" smtClean="0"/>
-              <a:t>3/3/2023</a:t>
+              <a:t>3/4/2023</a:t>
             </a:fld>
             <a:endParaRPr lang="en-US"/>
           </a:p>
@@ -1606,7 +1611,7 @@
           <a:p>
             <a:fld id="{F34933A6-C97B-4F74-B772-E8FCE02EB401}" type="datetimeFigureOut">
               <a:rPr lang="en-US" smtClean="0"/>
-              <a:t>3/3/2023</a:t>
+              <a:t>3/4/2023</a:t>
             </a:fld>
             <a:endParaRPr lang="en-US"/>
           </a:p>
@@ -1724,7 +1729,7 @@
           <a:p>
             <a:fld id="{F34933A6-C97B-4F74-B772-E8FCE02EB401}" type="datetimeFigureOut">
               <a:rPr lang="en-US" smtClean="0"/>
-              <a:t>3/3/2023</a:t>
+              <a:t>3/4/2023</a:t>
             </a:fld>
             <a:endParaRPr lang="en-US"/>
           </a:p>
@@ -1819,7 +1824,7 @@
           <a:p>
             <a:fld id="{F34933A6-C97B-4F74-B772-E8FCE02EB401}" type="datetimeFigureOut">
               <a:rPr lang="en-US" smtClean="0"/>
-              <a:t>3/3/2023</a:t>
+              <a:t>3/4/2023</a:t>
             </a:fld>
             <a:endParaRPr lang="en-US"/>
           </a:p>
@@ -2096,7 +2101,7 @@
           <a:p>
             <a:fld id="{F34933A6-C97B-4F74-B772-E8FCE02EB401}" type="datetimeFigureOut">
               <a:rPr lang="en-US" smtClean="0"/>
-              <a:t>3/3/2023</a:t>
+              <a:t>3/4/2023</a:t>
             </a:fld>
             <a:endParaRPr lang="en-US"/>
           </a:p>
@@ -2349,7 +2354,7 @@
           <a:p>
             <a:fld id="{F34933A6-C97B-4F74-B772-E8FCE02EB401}" type="datetimeFigureOut">
               <a:rPr lang="en-US" smtClean="0"/>
-              <a:t>3/3/2023</a:t>
+              <a:t>3/4/2023</a:t>
             </a:fld>
             <a:endParaRPr lang="en-US"/>
           </a:p>
@@ -2562,7 +2567,7 @@
           <a:p>
             <a:fld id="{F34933A6-C97B-4F74-B772-E8FCE02EB401}" type="datetimeFigureOut">
               <a:rPr lang="en-US" smtClean="0"/>
-              <a:t>3/3/2023</a:t>
+              <a:t>3/4/2023</a:t>
             </a:fld>
             <a:endParaRPr lang="en-US"/>
           </a:p>
@@ -3977,8 +3982,8 @@
         </p:nvSpPr>
         <p:spPr>
           <a:xfrm>
-            <a:off x="770466" y="1574800"/>
-            <a:ext cx="2065867" cy="558800"/>
+            <a:off x="205740" y="1469056"/>
+            <a:ext cx="2681392" cy="558800"/>
           </a:xfrm>
           <a:prstGeom prst="roundRect">
             <a:avLst/>
@@ -4024,7 +4029,7 @@
             </a:r>
             <a:r>
               <a:rPr lang="en-US" dirty="0" err="1" smtClean="0"/>
-              <a:t>load_ds</a:t>
+              <a:t>load_file</a:t>
             </a:r>
             <a:r>
               <a:rPr lang="en-US" dirty="0" smtClean="0"/>
@@ -4042,8 +4047,8 @@
         </p:nvSpPr>
         <p:spPr>
           <a:xfrm>
-            <a:off x="2904067" y="1574800"/>
-            <a:ext cx="812800" cy="369332"/>
+            <a:off x="2887131" y="1471863"/>
+            <a:ext cx="3841291" cy="369332"/>
           </a:xfrm>
           <a:prstGeom prst="rect">
             <a:avLst/>
@@ -4058,7 +4063,7 @@
           <a:p>
             <a:r>
               <a:rPr lang="en-US" dirty="0" smtClean="0"/>
-              <a:t>In [2]</a:t>
+              <a:t>Load a file into the notebook</a:t>
             </a:r>
             <a:endParaRPr lang="en-US" dirty="0"/>
           </a:p>
@@ -4072,8 +4077,8 @@
         </p:nvSpPr>
         <p:spPr>
           <a:xfrm>
-            <a:off x="770466" y="2455332"/>
-            <a:ext cx="2065867" cy="922867"/>
+            <a:off x="205740" y="2751836"/>
+            <a:ext cx="2698327" cy="695306"/>
           </a:xfrm>
           <a:prstGeom prst="roundRect">
             <a:avLst/>
@@ -4101,7 +4106,7 @@
           </a:fontRef>
         </p:style>
         <p:txBody>
-          <a:bodyPr rtlCol="0" anchor="ctr"/>
+          <a:bodyPr rtlCol="0" anchor="ctr" anchorCtr="0"/>
           <a:lstStyle/>
           <a:p>
             <a:pPr algn="ctr"/>
@@ -4119,7 +4124,7 @@
             </a:r>
             <a:r>
               <a:rPr lang="en-US" dirty="0" err="1" smtClean="0"/>
-              <a:t>reconfigure_toxic_categories</a:t>
+              <a:t>reconfigure_categories</a:t>
             </a:r>
             <a:r>
               <a:rPr lang="en-US" dirty="0" smtClean="0"/>
@@ -4131,44 +4136,14 @@
       </p:sp>
       <p:sp>
         <p:nvSpPr>
-          <p:cNvPr id="20" name="TextBox 19"/>
-          <p:cNvSpPr txBox="1"/>
-          <p:nvPr/>
-        </p:nvSpPr>
-        <p:spPr>
-          <a:xfrm>
-            <a:off x="2904067" y="2489199"/>
-            <a:ext cx="812800" cy="369332"/>
-          </a:xfrm>
-          <a:prstGeom prst="rect">
-            <a:avLst/>
-          </a:prstGeom>
-          <a:noFill/>
-        </p:spPr>
-        <p:txBody>
-          <a:bodyPr wrap="square" rtlCol="0">
-            <a:spAutoFit/>
-          </a:bodyPr>
-          <a:lstStyle/>
-          <a:p>
-            <a:r>
-              <a:rPr lang="en-US" dirty="0" smtClean="0"/>
-              <a:t>In [9]</a:t>
-            </a:r>
-            <a:endParaRPr lang="en-US" dirty="0"/>
-          </a:p>
-        </p:txBody>
-      </p:sp>
-      <p:sp>
-        <p:nvSpPr>
-          <p:cNvPr id="21" name="Rounded Rectangle 20"/>
+          <p:cNvPr id="23" name="Rounded Rectangle 22"/>
           <p:cNvSpPr/>
           <p:nvPr/>
         </p:nvSpPr>
         <p:spPr>
           <a:xfrm>
-            <a:off x="770465" y="3699931"/>
-            <a:ext cx="2065867" cy="922867"/>
+            <a:off x="205741" y="4344212"/>
+            <a:ext cx="2681392" cy="612101"/>
           </a:xfrm>
           <a:prstGeom prst="roundRect">
             <a:avLst/>
@@ -4214,7 +4189,7 @@
             </a:r>
             <a:r>
               <a:rPr lang="en-US" dirty="0" err="1" smtClean="0"/>
-              <a:t>add_toxic_level</a:t>
+              <a:t>train_subsample_df</a:t>
             </a:r>
             <a:r>
               <a:rPr lang="en-US" dirty="0" smtClean="0"/>
@@ -4226,44 +4201,14 @@
       </p:sp>
       <p:sp>
         <p:nvSpPr>
-          <p:cNvPr id="22" name="TextBox 21"/>
-          <p:cNvSpPr txBox="1"/>
-          <p:nvPr/>
-        </p:nvSpPr>
-        <p:spPr>
-          <a:xfrm>
-            <a:off x="2836332" y="3699931"/>
-            <a:ext cx="812800" cy="369332"/>
-          </a:xfrm>
-          <a:prstGeom prst="rect">
-            <a:avLst/>
-          </a:prstGeom>
-          <a:noFill/>
-        </p:spPr>
-        <p:txBody>
-          <a:bodyPr wrap="square" rtlCol="0">
-            <a:spAutoFit/>
-          </a:bodyPr>
-          <a:lstStyle/>
-          <a:p>
-            <a:r>
-              <a:rPr lang="en-US" dirty="0" smtClean="0"/>
-              <a:t>In [11]</a:t>
-            </a:r>
-            <a:endParaRPr lang="en-US" dirty="0"/>
-          </a:p>
-        </p:txBody>
-      </p:sp>
-      <p:sp>
-        <p:nvSpPr>
-          <p:cNvPr id="23" name="Rounded Rectangle 22"/>
+          <p:cNvPr id="25" name="Rounded Rectangle 24"/>
           <p:cNvSpPr/>
           <p:nvPr/>
         </p:nvSpPr>
         <p:spPr>
           <a:xfrm>
-            <a:off x="838200" y="4902195"/>
-            <a:ext cx="2065867" cy="922867"/>
+            <a:off x="6859471" y="1466979"/>
+            <a:ext cx="2065867" cy="560877"/>
           </a:xfrm>
           <a:prstGeom prst="roundRect">
             <a:avLst/>
@@ -4309,7 +4254,7 @@
             </a:r>
             <a:r>
               <a:rPr lang="en-US" dirty="0" err="1" smtClean="0"/>
-              <a:t>create_new_dataframe</a:t>
+              <a:t>reset_index</a:t>
             </a:r>
             <a:r>
               <a:rPr lang="en-US" dirty="0" smtClean="0"/>
@@ -4321,44 +4266,14 @@
       </p:sp>
       <p:sp>
         <p:nvSpPr>
-          <p:cNvPr id="24" name="TextBox 23"/>
-          <p:cNvSpPr txBox="1"/>
-          <p:nvPr/>
-        </p:nvSpPr>
-        <p:spPr>
-          <a:xfrm>
-            <a:off x="2887132" y="4847159"/>
-            <a:ext cx="812800" cy="369332"/>
-          </a:xfrm>
-          <a:prstGeom prst="rect">
-            <a:avLst/>
-          </a:prstGeom>
-          <a:noFill/>
-        </p:spPr>
-        <p:txBody>
-          <a:bodyPr wrap="square" rtlCol="0">
-            <a:spAutoFit/>
-          </a:bodyPr>
-          <a:lstStyle/>
-          <a:p>
-            <a:r>
-              <a:rPr lang="en-US" dirty="0" smtClean="0"/>
-              <a:t>In [12]</a:t>
-            </a:r>
-            <a:endParaRPr lang="en-US" dirty="0"/>
-          </a:p>
-        </p:txBody>
-      </p:sp>
-      <p:sp>
-        <p:nvSpPr>
-          <p:cNvPr id="25" name="Rounded Rectangle 24"/>
+          <p:cNvPr id="28" name="Rounded Rectangle 27"/>
           <p:cNvSpPr/>
           <p:nvPr/>
         </p:nvSpPr>
         <p:spPr>
           <a:xfrm>
-            <a:off x="4453466" y="1562095"/>
-            <a:ext cx="2065867" cy="922867"/>
+            <a:off x="6859471" y="2176623"/>
+            <a:ext cx="2065867" cy="492624"/>
           </a:xfrm>
           <a:prstGeom prst="roundRect">
             <a:avLst/>
@@ -4391,24 +4306,16 @@
           <a:p>
             <a:pPr algn="ctr"/>
             <a:r>
-              <a:rPr lang="en-US" dirty="0" err="1"/>
-              <a:t>d</a:t>
+              <a:rPr lang="en-US" dirty="0" smtClean="0"/>
+              <a:t>Def </a:t>
             </a:r>
             <a:r>
               <a:rPr lang="en-US" dirty="0" err="1" smtClean="0"/>
-              <a:t>ef</a:t>
+              <a:t>store_dfs</a:t>
             </a:r>
             <a:r>
               <a:rPr lang="en-US" dirty="0" smtClean="0"/>
-              <a:t> </a:t>
-            </a:r>
-            <a:r>
-              <a:rPr lang="en-US" dirty="0" err="1" smtClean="0"/>
-              <a:t>create_subsample_dataframe</a:t>
-            </a:r>
-            <a:r>
-              <a:rPr lang="en-US" dirty="0" smtClean="0"/>
-              <a:t>(x)</a:t>
+              <a:t>()</a:t>
             </a:r>
             <a:endParaRPr lang="en-US" dirty="0"/>
           </a:p>
@@ -4416,74 +4323,14 @@
       </p:sp>
       <p:sp>
         <p:nvSpPr>
-          <p:cNvPr id="26" name="TextBox 25"/>
-          <p:cNvSpPr txBox="1"/>
-          <p:nvPr/>
-        </p:nvSpPr>
-        <p:spPr>
-          <a:xfrm>
-            <a:off x="6519333" y="1529826"/>
-            <a:ext cx="812800" cy="923330"/>
-          </a:xfrm>
-          <a:prstGeom prst="rect">
-            <a:avLst/>
-          </a:prstGeom>
-          <a:noFill/>
-        </p:spPr>
-        <p:txBody>
-          <a:bodyPr wrap="square" rtlCol="0">
-            <a:spAutoFit/>
-          </a:bodyPr>
-          <a:lstStyle/>
-          <a:p>
-            <a:r>
-              <a:rPr lang="en-US" dirty="0" smtClean="0"/>
-              <a:t>In [13,1415]</a:t>
-            </a:r>
-            <a:endParaRPr lang="en-US" dirty="0"/>
-          </a:p>
-        </p:txBody>
-      </p:sp>
-      <p:sp>
-        <p:nvSpPr>
-          <p:cNvPr id="27" name="TextBox 26"/>
-          <p:cNvSpPr txBox="1"/>
-          <p:nvPr/>
-        </p:nvSpPr>
-        <p:spPr>
-          <a:xfrm>
-            <a:off x="4927599" y="2593599"/>
-            <a:ext cx="1998134" cy="646331"/>
-          </a:xfrm>
-          <a:prstGeom prst="rect">
-            <a:avLst/>
-          </a:prstGeom>
-          <a:noFill/>
-        </p:spPr>
-        <p:txBody>
-          <a:bodyPr wrap="square" rtlCol="0">
-            <a:spAutoFit/>
-          </a:bodyPr>
-          <a:lstStyle/>
-          <a:p>
-            <a:r>
-              <a:rPr lang="en-US" dirty="0" smtClean="0"/>
-              <a:t>Add value for ratio to change (x)</a:t>
-            </a:r>
-            <a:endParaRPr lang="en-US" dirty="0"/>
-          </a:p>
-        </p:txBody>
-      </p:sp>
-      <p:sp>
-        <p:nvSpPr>
-          <p:cNvPr id="28" name="Rounded Rectangle 27"/>
+          <p:cNvPr id="31" name="Rounded Rectangle 30"/>
           <p:cNvSpPr/>
           <p:nvPr/>
         </p:nvSpPr>
         <p:spPr>
           <a:xfrm>
-            <a:off x="4555066" y="3884597"/>
-            <a:ext cx="2065867" cy="922867"/>
+            <a:off x="203568" y="5770525"/>
+            <a:ext cx="2683564" cy="585806"/>
           </a:xfrm>
           <a:prstGeom prst="roundRect">
             <a:avLst/>
@@ -4529,7 +4376,7 @@
             </a:r>
             <a:r>
               <a:rPr lang="en-US" dirty="0" err="1" smtClean="0"/>
-              <a:t>text_cleaning</a:t>
+              <a:t>clean_comments</a:t>
             </a:r>
             <a:r>
               <a:rPr lang="en-US" dirty="0" smtClean="0"/>
@@ -4541,44 +4388,14 @@
       </p:sp>
       <p:sp>
         <p:nvSpPr>
-          <p:cNvPr id="29" name="TextBox 28"/>
-          <p:cNvSpPr txBox="1"/>
-          <p:nvPr/>
-        </p:nvSpPr>
-        <p:spPr>
-          <a:xfrm>
-            <a:off x="6688666" y="3874015"/>
-            <a:ext cx="812800" cy="923330"/>
-          </a:xfrm>
-          <a:prstGeom prst="rect">
-            <a:avLst/>
-          </a:prstGeom>
-          <a:noFill/>
-        </p:spPr>
-        <p:txBody>
-          <a:bodyPr wrap="square" rtlCol="0">
-            <a:spAutoFit/>
-          </a:bodyPr>
-          <a:lstStyle/>
-          <a:p>
-            <a:r>
-              <a:rPr lang="en-US" dirty="0" smtClean="0"/>
-              <a:t>In [19,21]</a:t>
-            </a:r>
-            <a:endParaRPr lang="en-US" dirty="0"/>
-          </a:p>
-        </p:txBody>
-      </p:sp>
-      <p:sp>
-        <p:nvSpPr>
-          <p:cNvPr id="31" name="Rounded Rectangle 30"/>
+          <p:cNvPr id="30" name="Rounded Rectangle 29"/>
           <p:cNvSpPr/>
           <p:nvPr/>
         </p:nvSpPr>
         <p:spPr>
           <a:xfrm>
-            <a:off x="4622799" y="5321290"/>
-            <a:ext cx="2065867" cy="922867"/>
+            <a:off x="205740" y="2110446"/>
+            <a:ext cx="2698327" cy="558800"/>
           </a:xfrm>
           <a:prstGeom prst="roundRect">
             <a:avLst/>
@@ -4624,7 +4441,7 @@
             </a:r>
             <a:r>
               <a:rPr lang="en-US" dirty="0" err="1" smtClean="0"/>
-              <a:t>store_data</a:t>
+              <a:t>load_mult_file</a:t>
             </a:r>
             <a:r>
               <a:rPr lang="en-US" dirty="0" smtClean="0"/>
@@ -4634,54 +4451,23 @@
           </a:p>
         </p:txBody>
       </p:sp>
-    </p:spTree>
-    <p:extLst>
-      <p:ext uri="{BB962C8B-B14F-4D97-AF65-F5344CB8AC3E}">
-        <p14:creationId xmlns:p14="http://schemas.microsoft.com/office/powerpoint/2010/main" val="1287818338"/>
-      </p:ext>
-    </p:extLst>
-  </p:cSld>
-  <p:clrMapOvr>
-    <a:masterClrMapping/>
-  </p:clrMapOvr>
-</p:sld>
-</file>
-
-<file path=ppt/slides/slide3.xml><?xml version="1.0" encoding="utf-8"?>
-<p:sld xmlns:a="http://schemas.openxmlformats.org/drawingml/2006/main" xmlns:r="http://schemas.openxmlformats.org/officeDocument/2006/relationships" xmlns:p="http://schemas.openxmlformats.org/presentationml/2006/main">
-  <p:cSld>
-    <p:spTree>
-      <p:nvGrpSpPr>
-        <p:cNvPr id="1" name=""/>
-        <p:cNvGrpSpPr/>
-        <p:nvPr/>
-      </p:nvGrpSpPr>
-      <p:grpSpPr>
-        <a:xfrm>
-          <a:off x="0" y="0"/>
-          <a:ext cx="0" cy="0"/>
-          <a:chOff x="0" y="0"/>
-          <a:chExt cx="0" cy="0"/>
-        </a:xfrm>
-      </p:grpSpPr>
-      <p:sp>
-        <p:nvSpPr>
-          <p:cNvPr id="10" name="Rectangle 9"/>
+      <p:sp>
+        <p:nvSpPr>
+          <p:cNvPr id="33" name="Rounded Rectangle 32"/>
           <p:cNvSpPr/>
           <p:nvPr/>
         </p:nvSpPr>
         <p:spPr>
           <a:xfrm>
-            <a:off x="1989667" y="618067"/>
-            <a:ext cx="4529666" cy="575733"/>
-          </a:xfrm>
-          <a:prstGeom prst="rect">
+            <a:off x="205740" y="3548024"/>
+            <a:ext cx="2698327" cy="695306"/>
+          </a:xfrm>
+          <a:prstGeom prst="roundRect">
             <a:avLst/>
           </a:prstGeom>
           <a:solidFill>
-            <a:schemeClr val="accent1">
-              <a:lumMod val="60000"/>
-              <a:lumOff val="40000"/>
+            <a:schemeClr val="bg1">
+              <a:lumMod val="65000"/>
             </a:schemeClr>
           </a:solidFill>
         </p:spPr>
@@ -4702,13 +4488,29 @@
           </a:fontRef>
         </p:style>
         <p:txBody>
-          <a:bodyPr rtlCol="0" anchor="ctr"/>
+          <a:bodyPr rtlCol="0" anchor="ctr" anchorCtr="0"/>
           <a:lstStyle/>
           <a:p>
             <a:pPr algn="ctr"/>
             <a:r>
+              <a:rPr lang="en-US" dirty="0" err="1"/>
+              <a:t>d</a:t>
+            </a:r>
+            <a:r>
+              <a:rPr lang="en-US" dirty="0" err="1" smtClean="0"/>
+              <a:t>ef</a:t>
+            </a:r>
+            <a:r>
               <a:rPr lang="en-US" dirty="0" smtClean="0"/>
-              <a:t>Data Exploration</a:t>
+              <a:t> </a:t>
+            </a:r>
+            <a:r>
+              <a:rPr lang="en-US" dirty="0" err="1" smtClean="0"/>
+              <a:t>filter_df</a:t>
+            </a:r>
+            <a:r>
+              <a:rPr lang="en-US" dirty="0" smtClean="0"/>
+              <a:t>()</a:t>
             </a:r>
             <a:endParaRPr lang="en-US" dirty="0"/>
           </a:p>
@@ -4716,18 +4518,23 @@
       </p:sp>
       <p:sp>
         <p:nvSpPr>
-          <p:cNvPr id="4" name="Rounded Rectangle 3"/>
+          <p:cNvPr id="34" name="Rounded Rectangle 33"/>
           <p:cNvSpPr/>
           <p:nvPr/>
         </p:nvSpPr>
         <p:spPr>
           <a:xfrm>
-            <a:off x="905933" y="618067"/>
-            <a:ext cx="1507067" cy="575733"/>
+            <a:off x="205739" y="5065312"/>
+            <a:ext cx="2681392" cy="612101"/>
           </a:xfrm>
           <a:prstGeom prst="roundRect">
             <a:avLst/>
           </a:prstGeom>
+          <a:solidFill>
+            <a:schemeClr val="bg1">
+              <a:lumMod val="65000"/>
+            </a:schemeClr>
+          </a:solidFill>
         </p:spPr>
         <p:style>
           <a:lnRef idx="2">
@@ -4751,99 +4558,6 @@
           <a:p>
             <a:pPr algn="ctr"/>
             <a:r>
-              <a:rPr lang="en-US" dirty="0" smtClean="0"/>
-              <a:t>Stage 1</a:t>
-            </a:r>
-            <a:endParaRPr lang="en-US" dirty="0"/>
-          </a:p>
-        </p:txBody>
-      </p:sp>
-      <p:sp>
-        <p:nvSpPr>
-          <p:cNvPr id="16" name="Rectangle 15"/>
-          <p:cNvSpPr/>
-          <p:nvPr/>
-        </p:nvSpPr>
-        <p:spPr>
-          <a:xfrm>
-            <a:off x="6519333" y="618067"/>
-            <a:ext cx="1786467" cy="575733"/>
-          </a:xfrm>
-          <a:prstGeom prst="rect">
-            <a:avLst/>
-          </a:prstGeom>
-        </p:spPr>
-        <p:style>
-          <a:lnRef idx="2">
-            <a:schemeClr val="accent1">
-              <a:shade val="50000"/>
-            </a:schemeClr>
-          </a:lnRef>
-          <a:fillRef idx="1">
-            <a:schemeClr val="accent1"/>
-          </a:fillRef>
-          <a:effectRef idx="0">
-            <a:schemeClr val="accent1"/>
-          </a:effectRef>
-          <a:fontRef idx="minor">
-            <a:schemeClr val="lt1"/>
-          </a:fontRef>
-        </p:style>
-        <p:txBody>
-          <a:bodyPr rtlCol="0" anchor="ctr"/>
-          <a:lstStyle/>
-          <a:p>
-            <a:pPr algn="ctr"/>
-            <a:r>
-              <a:rPr lang="en-US" dirty="0" smtClean="0"/>
-              <a:t>Notebook 2</a:t>
-            </a:r>
-            <a:endParaRPr lang="en-US" dirty="0"/>
-          </a:p>
-        </p:txBody>
-      </p:sp>
-      <p:sp>
-        <p:nvSpPr>
-          <p:cNvPr id="2" name="Rounded Rectangle 1"/>
-          <p:cNvSpPr/>
-          <p:nvPr/>
-        </p:nvSpPr>
-        <p:spPr>
-          <a:xfrm>
-            <a:off x="270934" y="1574799"/>
-            <a:ext cx="2565400" cy="829733"/>
-          </a:xfrm>
-          <a:prstGeom prst="roundRect">
-            <a:avLst/>
-          </a:prstGeom>
-          <a:solidFill>
-            <a:schemeClr val="bg1">
-              <a:lumMod val="65000"/>
-            </a:schemeClr>
-          </a:solidFill>
-        </p:spPr>
-        <p:style>
-          <a:lnRef idx="2">
-            <a:schemeClr val="accent1">
-              <a:shade val="50000"/>
-            </a:schemeClr>
-          </a:lnRef>
-          <a:fillRef idx="1">
-            <a:schemeClr val="accent1"/>
-          </a:fillRef>
-          <a:effectRef idx="0">
-            <a:schemeClr val="accent1"/>
-          </a:effectRef>
-          <a:fontRef idx="minor">
-            <a:schemeClr val="lt1"/>
-          </a:fontRef>
-        </p:style>
-        <p:txBody>
-          <a:bodyPr rtlCol="0" anchor="ctr"/>
-          <a:lstStyle/>
-          <a:p>
-            <a:pPr algn="ctr"/>
-            <a:r>
               <a:rPr lang="en-US" dirty="0" err="1"/>
               <a:t>d</a:t>
             </a:r>
@@ -4857,7 +4571,7 @@
             </a:r>
             <a:r>
               <a:rPr lang="en-US" dirty="0" err="1" smtClean="0"/>
-              <a:t>hist_comment_lengths</a:t>
+              <a:t>test_lab_subsample_df</a:t>
             </a:r>
             <a:r>
               <a:rPr lang="en-US" dirty="0" smtClean="0"/>
@@ -4869,14 +4583,14 @@
       </p:sp>
       <p:sp>
         <p:nvSpPr>
-          <p:cNvPr id="3" name="TextBox 2"/>
+          <p:cNvPr id="35" name="TextBox 34"/>
           <p:cNvSpPr txBox="1"/>
           <p:nvPr/>
         </p:nvSpPr>
         <p:spPr>
           <a:xfrm>
-            <a:off x="2904067" y="1574800"/>
-            <a:ext cx="812800" cy="369332"/>
+            <a:off x="2904065" y="2020829"/>
+            <a:ext cx="3841291" cy="646331"/>
           </a:xfrm>
           <a:prstGeom prst="rect">
             <a:avLst/>
@@ -4891,7 +4605,23 @@
           <a:p>
             <a:r>
               <a:rPr lang="en-US" dirty="0" smtClean="0"/>
-              <a:t>In [5]</a:t>
+              <a:t>Load the training </a:t>
+            </a:r>
+            <a:r>
+              <a:rPr lang="en-US" dirty="0" err="1" smtClean="0"/>
+              <a:t>df</a:t>
+            </a:r>
+            <a:r>
+              <a:rPr lang="en-US" dirty="0" smtClean="0"/>
+              <a:t>, test </a:t>
+            </a:r>
+            <a:r>
+              <a:rPr lang="en-US" dirty="0" err="1" smtClean="0"/>
+              <a:t>df</a:t>
+            </a:r>
+            <a:r>
+              <a:rPr lang="en-US" dirty="0" smtClean="0"/>
+              <a:t>, and test labels into the notebook</a:t>
             </a:r>
             <a:endParaRPr lang="en-US" dirty="0"/>
           </a:p>
@@ -4899,79 +4629,14 @@
       </p:sp>
       <p:sp>
         <p:nvSpPr>
-          <p:cNvPr id="7" name="Rounded Rectangle 6"/>
-          <p:cNvSpPr/>
-          <p:nvPr/>
-        </p:nvSpPr>
-        <p:spPr>
-          <a:xfrm>
-            <a:off x="376766" y="2624665"/>
-            <a:ext cx="2565400" cy="829733"/>
-          </a:xfrm>
-          <a:prstGeom prst="roundRect">
-            <a:avLst/>
-          </a:prstGeom>
-          <a:solidFill>
-            <a:schemeClr val="bg1">
-              <a:lumMod val="65000"/>
-            </a:schemeClr>
-          </a:solidFill>
-        </p:spPr>
-        <p:style>
-          <a:lnRef idx="2">
-            <a:schemeClr val="accent1">
-              <a:shade val="50000"/>
-            </a:schemeClr>
-          </a:lnRef>
-          <a:fillRef idx="1">
-            <a:schemeClr val="accent1"/>
-          </a:fillRef>
-          <a:effectRef idx="0">
-            <a:schemeClr val="accent1"/>
-          </a:effectRef>
-          <a:fontRef idx="minor">
-            <a:schemeClr val="lt1"/>
-          </a:fontRef>
-        </p:style>
-        <p:txBody>
-          <a:bodyPr rtlCol="0" anchor="ctr"/>
-          <a:lstStyle/>
-          <a:p>
-            <a:pPr algn="ctr"/>
-            <a:r>
-              <a:rPr lang="en-US" dirty="0" err="1"/>
-              <a:t>d</a:t>
-            </a:r>
-            <a:r>
-              <a:rPr lang="en-US" dirty="0" err="1" smtClean="0"/>
-              <a:t>ef</a:t>
-            </a:r>
-            <a:r>
-              <a:rPr lang="en-US" dirty="0" smtClean="0"/>
-              <a:t> </a:t>
-            </a:r>
-            <a:r>
-              <a:rPr lang="en-US" dirty="0" err="1" smtClean="0"/>
-              <a:t>clean_vs_toxic_ratio</a:t>
-            </a:r>
-            <a:r>
-              <a:rPr lang="en-US" dirty="0" smtClean="0"/>
-              <a:t>()</a:t>
-            </a:r>
-            <a:endParaRPr lang="en-US" dirty="0"/>
-          </a:p>
-        </p:txBody>
-      </p:sp>
-      <p:sp>
-        <p:nvSpPr>
-          <p:cNvPr id="8" name="TextBox 7"/>
+          <p:cNvPr id="36" name="TextBox 35"/>
           <p:cNvSpPr txBox="1"/>
           <p:nvPr/>
         </p:nvSpPr>
         <p:spPr>
           <a:xfrm>
-            <a:off x="2942166" y="2624665"/>
-            <a:ext cx="812800" cy="369332"/>
+            <a:off x="2904065" y="2770128"/>
+            <a:ext cx="3841291" cy="646331"/>
           </a:xfrm>
           <a:prstGeom prst="rect">
             <a:avLst/>
@@ -4986,7 +4651,7 @@
           <a:p>
             <a:r>
               <a:rPr lang="en-US" dirty="0" smtClean="0"/>
-              <a:t>In [6]</a:t>
+              <a:t>Add ‘overall_toxic’ and ‘non-toxic’ categories</a:t>
             </a:r>
             <a:endParaRPr lang="en-US" dirty="0"/>
           </a:p>
@@ -4994,79 +4659,14 @@
       </p:sp>
       <p:sp>
         <p:nvSpPr>
-          <p:cNvPr id="9" name="Rounded Rectangle 8"/>
-          <p:cNvSpPr/>
-          <p:nvPr/>
-        </p:nvSpPr>
-        <p:spPr>
-          <a:xfrm>
-            <a:off x="376766" y="3674530"/>
-            <a:ext cx="2565400" cy="829733"/>
-          </a:xfrm>
-          <a:prstGeom prst="roundRect">
-            <a:avLst/>
-          </a:prstGeom>
-          <a:solidFill>
-            <a:schemeClr val="bg1">
-              <a:lumMod val="65000"/>
-            </a:schemeClr>
-          </a:solidFill>
-        </p:spPr>
-        <p:style>
-          <a:lnRef idx="2">
-            <a:schemeClr val="accent1">
-              <a:shade val="50000"/>
-            </a:schemeClr>
-          </a:lnRef>
-          <a:fillRef idx="1">
-            <a:schemeClr val="accent1"/>
-          </a:fillRef>
-          <a:effectRef idx="0">
-            <a:schemeClr val="accent1"/>
-          </a:effectRef>
-          <a:fontRef idx="minor">
-            <a:schemeClr val="lt1"/>
-          </a:fontRef>
-        </p:style>
-        <p:txBody>
-          <a:bodyPr rtlCol="0" anchor="ctr"/>
-          <a:lstStyle/>
-          <a:p>
-            <a:pPr algn="ctr"/>
-            <a:r>
-              <a:rPr lang="en-US" dirty="0" err="1"/>
-              <a:t>d</a:t>
-            </a:r>
-            <a:r>
-              <a:rPr lang="en-US" dirty="0" err="1" smtClean="0"/>
-              <a:t>ef</a:t>
-            </a:r>
-            <a:r>
-              <a:rPr lang="en-US" dirty="0" smtClean="0"/>
-              <a:t> </a:t>
-            </a:r>
-            <a:r>
-              <a:rPr lang="en-US" dirty="0" err="1" smtClean="0"/>
-              <a:t>plot_comment_classes</a:t>
-            </a:r>
-            <a:r>
-              <a:rPr lang="en-US" dirty="0" smtClean="0"/>
-              <a:t>()</a:t>
-            </a:r>
-            <a:endParaRPr lang="en-US" dirty="0"/>
-          </a:p>
-        </p:txBody>
-      </p:sp>
-      <p:sp>
-        <p:nvSpPr>
-          <p:cNvPr id="11" name="TextBox 10"/>
+          <p:cNvPr id="37" name="TextBox 36"/>
           <p:cNvSpPr txBox="1"/>
           <p:nvPr/>
         </p:nvSpPr>
         <p:spPr>
           <a:xfrm>
-            <a:off x="2946399" y="3674527"/>
-            <a:ext cx="812800" cy="369332"/>
+            <a:off x="2904065" y="3564408"/>
+            <a:ext cx="3841291" cy="646331"/>
           </a:xfrm>
           <a:prstGeom prst="rect">
             <a:avLst/>
@@ -5081,7 +4681,7 @@
           <a:p>
             <a:r>
               <a:rPr lang="en-US" dirty="0" smtClean="0"/>
-              <a:t>In [7]</a:t>
+              <a:t>Create new data frames with just the two new categories</a:t>
             </a:r>
             <a:endParaRPr lang="en-US" dirty="0"/>
           </a:p>
@@ -5089,79 +4689,14 @@
       </p:sp>
       <p:sp>
         <p:nvSpPr>
-          <p:cNvPr id="12" name="Rounded Rectangle 11"/>
-          <p:cNvSpPr/>
-          <p:nvPr/>
-        </p:nvSpPr>
-        <p:spPr>
-          <a:xfrm>
-            <a:off x="376766" y="4724389"/>
-            <a:ext cx="2565400" cy="829733"/>
-          </a:xfrm>
-          <a:prstGeom prst="roundRect">
-            <a:avLst/>
-          </a:prstGeom>
-          <a:solidFill>
-            <a:schemeClr val="bg1">
-              <a:lumMod val="65000"/>
-            </a:schemeClr>
-          </a:solidFill>
-        </p:spPr>
-        <p:style>
-          <a:lnRef idx="2">
-            <a:schemeClr val="accent1">
-              <a:shade val="50000"/>
-            </a:schemeClr>
-          </a:lnRef>
-          <a:fillRef idx="1">
-            <a:schemeClr val="accent1"/>
-          </a:fillRef>
-          <a:effectRef idx="0">
-            <a:schemeClr val="accent1"/>
-          </a:effectRef>
-          <a:fontRef idx="minor">
-            <a:schemeClr val="lt1"/>
-          </a:fontRef>
-        </p:style>
-        <p:txBody>
-          <a:bodyPr rtlCol="0" anchor="ctr"/>
-          <a:lstStyle/>
-          <a:p>
-            <a:pPr algn="ctr"/>
-            <a:r>
-              <a:rPr lang="en-US" dirty="0" err="1"/>
-              <a:t>d</a:t>
-            </a:r>
-            <a:r>
-              <a:rPr lang="en-US" dirty="0" err="1" smtClean="0"/>
-              <a:t>ef</a:t>
-            </a:r>
-            <a:r>
-              <a:rPr lang="en-US" dirty="0" smtClean="0"/>
-              <a:t> </a:t>
-            </a:r>
-            <a:r>
-              <a:rPr lang="en-US" dirty="0" err="1" smtClean="0"/>
-              <a:t>plot_multiple_classes</a:t>
-            </a:r>
-            <a:r>
-              <a:rPr lang="en-US" dirty="0" smtClean="0"/>
-              <a:t>()</a:t>
-            </a:r>
-            <a:endParaRPr lang="en-US" dirty="0"/>
-          </a:p>
-        </p:txBody>
-      </p:sp>
-      <p:sp>
-        <p:nvSpPr>
-          <p:cNvPr id="13" name="TextBox 12"/>
+          <p:cNvPr id="38" name="TextBox 37"/>
           <p:cNvSpPr txBox="1"/>
           <p:nvPr/>
         </p:nvSpPr>
         <p:spPr>
           <a:xfrm>
-            <a:off x="2912534" y="4700597"/>
-            <a:ext cx="812800" cy="369332"/>
+            <a:off x="2904065" y="4327096"/>
+            <a:ext cx="3841291" cy="646331"/>
           </a:xfrm>
           <a:prstGeom prst="rect">
             <a:avLst/>
@@ -5176,7 +4711,155 @@
           <a:p>
             <a:r>
               <a:rPr lang="en-US" dirty="0" smtClean="0"/>
-              <a:t>In [8]</a:t>
+              <a:t>Take subsample of training </a:t>
+            </a:r>
+            <a:r>
+              <a:rPr lang="en-US" dirty="0" err="1" smtClean="0"/>
+              <a:t>df</a:t>
+            </a:r>
+            <a:r>
+              <a:rPr lang="en-US" dirty="0" smtClean="0"/>
+              <a:t> with custom ratios for each category</a:t>
+            </a:r>
+            <a:endParaRPr lang="en-US" dirty="0"/>
+          </a:p>
+        </p:txBody>
+      </p:sp>
+      <p:sp>
+        <p:nvSpPr>
+          <p:cNvPr id="39" name="TextBox 38"/>
+          <p:cNvSpPr txBox="1"/>
+          <p:nvPr/>
+        </p:nvSpPr>
+        <p:spPr>
+          <a:xfrm>
+            <a:off x="2904065" y="5031082"/>
+            <a:ext cx="3841291" cy="646331"/>
+          </a:xfrm>
+          <a:prstGeom prst="rect">
+            <a:avLst/>
+          </a:prstGeom>
+          <a:noFill/>
+        </p:spPr>
+        <p:txBody>
+          <a:bodyPr wrap="square" rtlCol="0">
+            <a:spAutoFit/>
+          </a:bodyPr>
+          <a:lstStyle/>
+          <a:p>
+            <a:r>
+              <a:rPr lang="en-US" dirty="0" smtClean="0"/>
+              <a:t>Take subsample of testing </a:t>
+            </a:r>
+            <a:r>
+              <a:rPr lang="en-US" dirty="0" err="1" smtClean="0"/>
+              <a:t>df</a:t>
+            </a:r>
+            <a:r>
+              <a:rPr lang="en-US" dirty="0" smtClean="0"/>
+              <a:t> with custom ratios for each category</a:t>
+            </a:r>
+            <a:endParaRPr lang="en-US" dirty="0"/>
+          </a:p>
+        </p:txBody>
+      </p:sp>
+      <p:sp>
+        <p:nvSpPr>
+          <p:cNvPr id="40" name="TextBox 39"/>
+          <p:cNvSpPr txBox="1"/>
+          <p:nvPr/>
+        </p:nvSpPr>
+        <p:spPr>
+          <a:xfrm>
+            <a:off x="2887130" y="5710000"/>
+            <a:ext cx="3841291" cy="646331"/>
+          </a:xfrm>
+          <a:prstGeom prst="rect">
+            <a:avLst/>
+          </a:prstGeom>
+          <a:noFill/>
+        </p:spPr>
+        <p:txBody>
+          <a:bodyPr wrap="square" rtlCol="0">
+            <a:spAutoFit/>
+          </a:bodyPr>
+          <a:lstStyle/>
+          <a:p>
+            <a:r>
+              <a:rPr lang="en-US" dirty="0" smtClean="0"/>
+              <a:t>Clean comments for both training and testing subsamples</a:t>
+            </a:r>
+            <a:endParaRPr lang="en-US" dirty="0"/>
+          </a:p>
+        </p:txBody>
+      </p:sp>
+      <p:sp>
+        <p:nvSpPr>
+          <p:cNvPr id="41" name="TextBox 40"/>
+          <p:cNvSpPr txBox="1"/>
+          <p:nvPr/>
+        </p:nvSpPr>
+        <p:spPr>
+          <a:xfrm>
+            <a:off x="9039453" y="1471863"/>
+            <a:ext cx="2486627" cy="369332"/>
+          </a:xfrm>
+          <a:prstGeom prst="rect">
+            <a:avLst/>
+          </a:prstGeom>
+          <a:noFill/>
+        </p:spPr>
+        <p:txBody>
+          <a:bodyPr wrap="square" rtlCol="0">
+            <a:spAutoFit/>
+          </a:bodyPr>
+          <a:lstStyle/>
+          <a:p>
+            <a:r>
+              <a:rPr lang="en-US" dirty="0" smtClean="0"/>
+              <a:t>Reset the index for </a:t>
+            </a:r>
+            <a:r>
+              <a:rPr lang="en-US" dirty="0" err="1" smtClean="0"/>
+              <a:t>df’s</a:t>
+            </a:r>
+            <a:endParaRPr lang="en-US" dirty="0"/>
+          </a:p>
+        </p:txBody>
+      </p:sp>
+      <p:sp>
+        <p:nvSpPr>
+          <p:cNvPr id="43" name="TextBox 42"/>
+          <p:cNvSpPr txBox="1"/>
+          <p:nvPr/>
+        </p:nvSpPr>
+        <p:spPr>
+          <a:xfrm>
+            <a:off x="9039452" y="2110446"/>
+            <a:ext cx="2486627" cy="369332"/>
+          </a:xfrm>
+          <a:prstGeom prst="rect">
+            <a:avLst/>
+          </a:prstGeom>
+          <a:noFill/>
+        </p:spPr>
+        <p:txBody>
+          <a:bodyPr wrap="square" rtlCol="0">
+            <a:spAutoFit/>
+          </a:bodyPr>
+          <a:lstStyle/>
+          <a:p>
+            <a:r>
+              <a:rPr lang="en-US" dirty="0" smtClean="0"/>
+              <a:t>Save the </a:t>
+            </a:r>
+            <a:r>
+              <a:rPr lang="en-US" dirty="0" err="1" smtClean="0"/>
+              <a:t>df’s</a:t>
+            </a:r>
+            <a:r>
+              <a:rPr lang="en-US" dirty="0" smtClean="0"/>
+              <a:t> to a file</a:t>
             </a:r>
             <a:endParaRPr lang="en-US" dirty="0"/>
           </a:p>
@@ -5185,7 +4868,7 @@
     </p:spTree>
     <p:extLst>
       <p:ext uri="{BB962C8B-B14F-4D97-AF65-F5344CB8AC3E}">
-        <p14:creationId xmlns:p14="http://schemas.microsoft.com/office/powerpoint/2010/main" val="3577539451"/>
+        <p14:creationId xmlns:p14="http://schemas.microsoft.com/office/powerpoint/2010/main" val="1287818338"/>
       </p:ext>
     </p:extLst>
   </p:cSld>
@@ -5195,7 +4878,7 @@
 </p:sld>
 </file>
 
-<file path=ppt/slides/slide4.xml><?xml version="1.0" encoding="utf-8"?>
+<file path=ppt/slides/slide3.xml><?xml version="1.0" encoding="utf-8"?>
 <p:sld xmlns:a="http://schemas.openxmlformats.org/drawingml/2006/main" xmlns:r="http://schemas.openxmlformats.org/officeDocument/2006/relationships" xmlns:p="http://schemas.openxmlformats.org/presentationml/2006/main">
   <p:cSld>
     <p:spTree>
@@ -6445,11 +6128,6 @@
               </a:rPr>
               <a:t>]</a:t>
             </a:r>
-            <a:endParaRPr lang="en-US" sz="3600" dirty="0">
-              <a:solidFill>
-                <a:srgbClr val="FF00FF"/>
-              </a:solidFill>
-            </a:endParaRPr>
           </a:p>
         </p:txBody>
       </p:sp>
@@ -6944,6 +6622,554 @@
     <p:extLst>
       <p:ext uri="{BB962C8B-B14F-4D97-AF65-F5344CB8AC3E}">
         <p14:creationId xmlns:p14="http://schemas.microsoft.com/office/powerpoint/2010/main" val="660626813"/>
+      </p:ext>
+    </p:extLst>
+  </p:cSld>
+  <p:clrMapOvr>
+    <a:masterClrMapping/>
+  </p:clrMapOvr>
+</p:sld>
+</file>
+
+<file path=ppt/slides/slide4.xml><?xml version="1.0" encoding="utf-8"?>
+<p:sld xmlns:a="http://schemas.openxmlformats.org/drawingml/2006/main" xmlns:r="http://schemas.openxmlformats.org/officeDocument/2006/relationships" xmlns:p="http://schemas.openxmlformats.org/presentationml/2006/main">
+  <p:cSld>
+    <p:spTree>
+      <p:nvGrpSpPr>
+        <p:cNvPr id="1" name=""/>
+        <p:cNvGrpSpPr/>
+        <p:nvPr/>
+      </p:nvGrpSpPr>
+      <p:grpSpPr>
+        <a:xfrm>
+          <a:off x="0" y="0"/>
+          <a:ext cx="0" cy="0"/>
+          <a:chOff x="0" y="0"/>
+          <a:chExt cx="0" cy="0"/>
+        </a:xfrm>
+      </p:grpSpPr>
+      <p:sp>
+        <p:nvSpPr>
+          <p:cNvPr id="10" name="Rectangle 9"/>
+          <p:cNvSpPr/>
+          <p:nvPr/>
+        </p:nvSpPr>
+        <p:spPr>
+          <a:xfrm>
+            <a:off x="1989667" y="618067"/>
+            <a:ext cx="4529666" cy="575733"/>
+          </a:xfrm>
+          <a:prstGeom prst="rect">
+            <a:avLst/>
+          </a:prstGeom>
+          <a:solidFill>
+            <a:schemeClr val="accent1">
+              <a:lumMod val="60000"/>
+              <a:lumOff val="40000"/>
+            </a:schemeClr>
+          </a:solidFill>
+        </p:spPr>
+        <p:style>
+          <a:lnRef idx="2">
+            <a:schemeClr val="accent1">
+              <a:shade val="50000"/>
+            </a:schemeClr>
+          </a:lnRef>
+          <a:fillRef idx="1">
+            <a:schemeClr val="accent1"/>
+          </a:fillRef>
+          <a:effectRef idx="0">
+            <a:schemeClr val="accent1"/>
+          </a:effectRef>
+          <a:fontRef idx="minor">
+            <a:schemeClr val="lt1"/>
+          </a:fontRef>
+        </p:style>
+        <p:txBody>
+          <a:bodyPr rtlCol="0" anchor="ctr"/>
+          <a:lstStyle/>
+          <a:p>
+            <a:pPr algn="ctr"/>
+            <a:r>
+              <a:rPr lang="en-US" dirty="0" smtClean="0"/>
+              <a:t>Data Exploration</a:t>
+            </a:r>
+            <a:endParaRPr lang="en-US" dirty="0"/>
+          </a:p>
+        </p:txBody>
+      </p:sp>
+      <p:sp>
+        <p:nvSpPr>
+          <p:cNvPr id="4" name="Rounded Rectangle 3"/>
+          <p:cNvSpPr/>
+          <p:nvPr/>
+        </p:nvSpPr>
+        <p:spPr>
+          <a:xfrm>
+            <a:off x="905933" y="618067"/>
+            <a:ext cx="1507067" cy="575733"/>
+          </a:xfrm>
+          <a:prstGeom prst="roundRect">
+            <a:avLst/>
+          </a:prstGeom>
+        </p:spPr>
+        <p:style>
+          <a:lnRef idx="2">
+            <a:schemeClr val="accent1">
+              <a:shade val="50000"/>
+            </a:schemeClr>
+          </a:lnRef>
+          <a:fillRef idx="1">
+            <a:schemeClr val="accent1"/>
+          </a:fillRef>
+          <a:effectRef idx="0">
+            <a:schemeClr val="accent1"/>
+          </a:effectRef>
+          <a:fontRef idx="minor">
+            <a:schemeClr val="lt1"/>
+          </a:fontRef>
+        </p:style>
+        <p:txBody>
+          <a:bodyPr rtlCol="0" anchor="ctr"/>
+          <a:lstStyle/>
+          <a:p>
+            <a:pPr algn="ctr"/>
+            <a:r>
+              <a:rPr lang="en-US" dirty="0" smtClean="0"/>
+              <a:t>Stage 1</a:t>
+            </a:r>
+            <a:endParaRPr lang="en-US" dirty="0"/>
+          </a:p>
+        </p:txBody>
+      </p:sp>
+      <p:sp>
+        <p:nvSpPr>
+          <p:cNvPr id="16" name="Rectangle 15"/>
+          <p:cNvSpPr/>
+          <p:nvPr/>
+        </p:nvSpPr>
+        <p:spPr>
+          <a:xfrm>
+            <a:off x="6519333" y="618067"/>
+            <a:ext cx="1786467" cy="575733"/>
+          </a:xfrm>
+          <a:prstGeom prst="rect">
+            <a:avLst/>
+          </a:prstGeom>
+        </p:spPr>
+        <p:style>
+          <a:lnRef idx="2">
+            <a:schemeClr val="accent1">
+              <a:shade val="50000"/>
+            </a:schemeClr>
+          </a:lnRef>
+          <a:fillRef idx="1">
+            <a:schemeClr val="accent1"/>
+          </a:fillRef>
+          <a:effectRef idx="0">
+            <a:schemeClr val="accent1"/>
+          </a:effectRef>
+          <a:fontRef idx="minor">
+            <a:schemeClr val="lt1"/>
+          </a:fontRef>
+        </p:style>
+        <p:txBody>
+          <a:bodyPr rtlCol="0" anchor="ctr"/>
+          <a:lstStyle/>
+          <a:p>
+            <a:pPr algn="ctr"/>
+            <a:r>
+              <a:rPr lang="en-US" dirty="0" smtClean="0"/>
+              <a:t>Notebook 2</a:t>
+            </a:r>
+            <a:endParaRPr lang="en-US" dirty="0"/>
+          </a:p>
+        </p:txBody>
+      </p:sp>
+      <p:sp>
+        <p:nvSpPr>
+          <p:cNvPr id="2" name="Rounded Rectangle 1"/>
+          <p:cNvSpPr/>
+          <p:nvPr/>
+        </p:nvSpPr>
+        <p:spPr>
+          <a:xfrm>
+            <a:off x="270934" y="1574799"/>
+            <a:ext cx="2565400" cy="829733"/>
+          </a:xfrm>
+          <a:prstGeom prst="roundRect">
+            <a:avLst/>
+          </a:prstGeom>
+          <a:solidFill>
+            <a:schemeClr val="bg1">
+              <a:lumMod val="65000"/>
+            </a:schemeClr>
+          </a:solidFill>
+        </p:spPr>
+        <p:style>
+          <a:lnRef idx="2">
+            <a:schemeClr val="accent1">
+              <a:shade val="50000"/>
+            </a:schemeClr>
+          </a:lnRef>
+          <a:fillRef idx="1">
+            <a:schemeClr val="accent1"/>
+          </a:fillRef>
+          <a:effectRef idx="0">
+            <a:schemeClr val="accent1"/>
+          </a:effectRef>
+          <a:fontRef idx="minor">
+            <a:schemeClr val="lt1"/>
+          </a:fontRef>
+        </p:style>
+        <p:txBody>
+          <a:bodyPr rtlCol="0" anchor="ctr"/>
+          <a:lstStyle/>
+          <a:p>
+            <a:pPr algn="ctr"/>
+            <a:r>
+              <a:rPr lang="en-US" dirty="0" err="1"/>
+              <a:t>d</a:t>
+            </a:r>
+            <a:r>
+              <a:rPr lang="en-US" dirty="0" err="1" smtClean="0"/>
+              <a:t>ef</a:t>
+            </a:r>
+            <a:r>
+              <a:rPr lang="en-US" dirty="0" smtClean="0"/>
+              <a:t> </a:t>
+            </a:r>
+            <a:r>
+              <a:rPr lang="en-US" dirty="0" err="1" smtClean="0"/>
+              <a:t>hist_comment_lengths</a:t>
+            </a:r>
+            <a:r>
+              <a:rPr lang="en-US" dirty="0" smtClean="0"/>
+              <a:t>()</a:t>
+            </a:r>
+            <a:endParaRPr lang="en-US" dirty="0"/>
+          </a:p>
+        </p:txBody>
+      </p:sp>
+      <p:sp>
+        <p:nvSpPr>
+          <p:cNvPr id="3" name="TextBox 2"/>
+          <p:cNvSpPr txBox="1"/>
+          <p:nvPr/>
+        </p:nvSpPr>
+        <p:spPr>
+          <a:xfrm>
+            <a:off x="2904067" y="1574800"/>
+            <a:ext cx="812800" cy="369332"/>
+          </a:xfrm>
+          <a:prstGeom prst="rect">
+            <a:avLst/>
+          </a:prstGeom>
+          <a:noFill/>
+        </p:spPr>
+        <p:txBody>
+          <a:bodyPr wrap="square" rtlCol="0">
+            <a:spAutoFit/>
+          </a:bodyPr>
+          <a:lstStyle/>
+          <a:p>
+            <a:r>
+              <a:rPr lang="en-US" dirty="0" smtClean="0"/>
+              <a:t>In [5]</a:t>
+            </a:r>
+            <a:endParaRPr lang="en-US" dirty="0"/>
+          </a:p>
+        </p:txBody>
+      </p:sp>
+      <p:sp>
+        <p:nvSpPr>
+          <p:cNvPr id="7" name="Rounded Rectangle 6"/>
+          <p:cNvSpPr/>
+          <p:nvPr/>
+        </p:nvSpPr>
+        <p:spPr>
+          <a:xfrm>
+            <a:off x="376766" y="2624665"/>
+            <a:ext cx="2565400" cy="829733"/>
+          </a:xfrm>
+          <a:prstGeom prst="roundRect">
+            <a:avLst/>
+          </a:prstGeom>
+          <a:solidFill>
+            <a:schemeClr val="bg1">
+              <a:lumMod val="65000"/>
+            </a:schemeClr>
+          </a:solidFill>
+        </p:spPr>
+        <p:style>
+          <a:lnRef idx="2">
+            <a:schemeClr val="accent1">
+              <a:shade val="50000"/>
+            </a:schemeClr>
+          </a:lnRef>
+          <a:fillRef idx="1">
+            <a:schemeClr val="accent1"/>
+          </a:fillRef>
+          <a:effectRef idx="0">
+            <a:schemeClr val="accent1"/>
+          </a:effectRef>
+          <a:fontRef idx="minor">
+            <a:schemeClr val="lt1"/>
+          </a:fontRef>
+        </p:style>
+        <p:txBody>
+          <a:bodyPr rtlCol="0" anchor="ctr"/>
+          <a:lstStyle/>
+          <a:p>
+            <a:pPr algn="ctr"/>
+            <a:r>
+              <a:rPr lang="en-US" dirty="0" err="1"/>
+              <a:t>d</a:t>
+            </a:r>
+            <a:r>
+              <a:rPr lang="en-US" dirty="0" err="1" smtClean="0"/>
+              <a:t>ef</a:t>
+            </a:r>
+            <a:r>
+              <a:rPr lang="en-US" dirty="0" smtClean="0"/>
+              <a:t> </a:t>
+            </a:r>
+            <a:r>
+              <a:rPr lang="en-US" dirty="0" err="1" smtClean="0"/>
+              <a:t>clean_vs_toxic_ratio</a:t>
+            </a:r>
+            <a:r>
+              <a:rPr lang="en-US" dirty="0" smtClean="0"/>
+              <a:t>()</a:t>
+            </a:r>
+            <a:endParaRPr lang="en-US" dirty="0"/>
+          </a:p>
+        </p:txBody>
+      </p:sp>
+      <p:sp>
+        <p:nvSpPr>
+          <p:cNvPr id="8" name="TextBox 7"/>
+          <p:cNvSpPr txBox="1"/>
+          <p:nvPr/>
+        </p:nvSpPr>
+        <p:spPr>
+          <a:xfrm>
+            <a:off x="2942166" y="2624665"/>
+            <a:ext cx="812800" cy="369332"/>
+          </a:xfrm>
+          <a:prstGeom prst="rect">
+            <a:avLst/>
+          </a:prstGeom>
+          <a:noFill/>
+        </p:spPr>
+        <p:txBody>
+          <a:bodyPr wrap="square" rtlCol="0">
+            <a:spAutoFit/>
+          </a:bodyPr>
+          <a:lstStyle/>
+          <a:p>
+            <a:r>
+              <a:rPr lang="en-US" dirty="0" smtClean="0"/>
+              <a:t>In [6]</a:t>
+            </a:r>
+            <a:endParaRPr lang="en-US" dirty="0"/>
+          </a:p>
+        </p:txBody>
+      </p:sp>
+      <p:sp>
+        <p:nvSpPr>
+          <p:cNvPr id="9" name="Rounded Rectangle 8"/>
+          <p:cNvSpPr/>
+          <p:nvPr/>
+        </p:nvSpPr>
+        <p:spPr>
+          <a:xfrm>
+            <a:off x="376766" y="3674530"/>
+            <a:ext cx="2565400" cy="829733"/>
+          </a:xfrm>
+          <a:prstGeom prst="roundRect">
+            <a:avLst/>
+          </a:prstGeom>
+          <a:solidFill>
+            <a:schemeClr val="bg1">
+              <a:lumMod val="65000"/>
+            </a:schemeClr>
+          </a:solidFill>
+        </p:spPr>
+        <p:style>
+          <a:lnRef idx="2">
+            <a:schemeClr val="accent1">
+              <a:shade val="50000"/>
+            </a:schemeClr>
+          </a:lnRef>
+          <a:fillRef idx="1">
+            <a:schemeClr val="accent1"/>
+          </a:fillRef>
+          <a:effectRef idx="0">
+            <a:schemeClr val="accent1"/>
+          </a:effectRef>
+          <a:fontRef idx="minor">
+            <a:schemeClr val="lt1"/>
+          </a:fontRef>
+        </p:style>
+        <p:txBody>
+          <a:bodyPr rtlCol="0" anchor="ctr"/>
+          <a:lstStyle/>
+          <a:p>
+            <a:pPr algn="ctr"/>
+            <a:r>
+              <a:rPr lang="en-US" dirty="0" err="1"/>
+              <a:t>d</a:t>
+            </a:r>
+            <a:r>
+              <a:rPr lang="en-US" dirty="0" err="1" smtClean="0"/>
+              <a:t>ef</a:t>
+            </a:r>
+            <a:r>
+              <a:rPr lang="en-US" dirty="0" smtClean="0"/>
+              <a:t> </a:t>
+            </a:r>
+            <a:r>
+              <a:rPr lang="en-US" dirty="0" err="1" smtClean="0"/>
+              <a:t>plot_comment_classes</a:t>
+            </a:r>
+            <a:r>
+              <a:rPr lang="en-US" dirty="0" smtClean="0"/>
+              <a:t>()</a:t>
+            </a:r>
+            <a:endParaRPr lang="en-US" dirty="0"/>
+          </a:p>
+        </p:txBody>
+      </p:sp>
+      <p:sp>
+        <p:nvSpPr>
+          <p:cNvPr id="11" name="TextBox 10"/>
+          <p:cNvSpPr txBox="1"/>
+          <p:nvPr/>
+        </p:nvSpPr>
+        <p:spPr>
+          <a:xfrm>
+            <a:off x="2946399" y="3674527"/>
+            <a:ext cx="812800" cy="369332"/>
+          </a:xfrm>
+          <a:prstGeom prst="rect">
+            <a:avLst/>
+          </a:prstGeom>
+          <a:noFill/>
+        </p:spPr>
+        <p:txBody>
+          <a:bodyPr wrap="square" rtlCol="0">
+            <a:spAutoFit/>
+          </a:bodyPr>
+          <a:lstStyle/>
+          <a:p>
+            <a:r>
+              <a:rPr lang="en-US" dirty="0" smtClean="0"/>
+              <a:t>In [7]</a:t>
+            </a:r>
+            <a:endParaRPr lang="en-US" dirty="0"/>
+          </a:p>
+        </p:txBody>
+      </p:sp>
+      <p:sp>
+        <p:nvSpPr>
+          <p:cNvPr id="12" name="Rounded Rectangle 11"/>
+          <p:cNvSpPr/>
+          <p:nvPr/>
+        </p:nvSpPr>
+        <p:spPr>
+          <a:xfrm>
+            <a:off x="376766" y="4724389"/>
+            <a:ext cx="2565400" cy="829733"/>
+          </a:xfrm>
+          <a:prstGeom prst="roundRect">
+            <a:avLst/>
+          </a:prstGeom>
+          <a:solidFill>
+            <a:schemeClr val="bg1">
+              <a:lumMod val="65000"/>
+            </a:schemeClr>
+          </a:solidFill>
+        </p:spPr>
+        <p:style>
+          <a:lnRef idx="2">
+            <a:schemeClr val="accent1">
+              <a:shade val="50000"/>
+            </a:schemeClr>
+          </a:lnRef>
+          <a:fillRef idx="1">
+            <a:schemeClr val="accent1"/>
+          </a:fillRef>
+          <a:effectRef idx="0">
+            <a:schemeClr val="accent1"/>
+          </a:effectRef>
+          <a:fontRef idx="minor">
+            <a:schemeClr val="lt1"/>
+          </a:fontRef>
+        </p:style>
+        <p:txBody>
+          <a:bodyPr rtlCol="0" anchor="ctr"/>
+          <a:lstStyle/>
+          <a:p>
+            <a:pPr algn="ctr"/>
+            <a:r>
+              <a:rPr lang="en-US" dirty="0" err="1"/>
+              <a:t>d</a:t>
+            </a:r>
+            <a:r>
+              <a:rPr lang="en-US" dirty="0" err="1" smtClean="0"/>
+              <a:t>ef</a:t>
+            </a:r>
+            <a:r>
+              <a:rPr lang="en-US" dirty="0" smtClean="0"/>
+              <a:t> </a:t>
+            </a:r>
+            <a:r>
+              <a:rPr lang="en-US" dirty="0" err="1" smtClean="0"/>
+              <a:t>plot_multiple_classes</a:t>
+            </a:r>
+            <a:r>
+              <a:rPr lang="en-US" dirty="0" smtClean="0"/>
+              <a:t>()</a:t>
+            </a:r>
+            <a:endParaRPr lang="en-US" dirty="0"/>
+          </a:p>
+        </p:txBody>
+      </p:sp>
+      <p:sp>
+        <p:nvSpPr>
+          <p:cNvPr id="13" name="TextBox 12"/>
+          <p:cNvSpPr txBox="1"/>
+          <p:nvPr/>
+        </p:nvSpPr>
+        <p:spPr>
+          <a:xfrm>
+            <a:off x="2912534" y="4700597"/>
+            <a:ext cx="812800" cy="369332"/>
+          </a:xfrm>
+          <a:prstGeom prst="rect">
+            <a:avLst/>
+          </a:prstGeom>
+          <a:noFill/>
+        </p:spPr>
+        <p:txBody>
+          <a:bodyPr wrap="square" rtlCol="0">
+            <a:spAutoFit/>
+          </a:bodyPr>
+          <a:lstStyle/>
+          <a:p>
+            <a:r>
+              <a:rPr lang="en-US" dirty="0" smtClean="0"/>
+              <a:t>In [8]</a:t>
+            </a:r>
+            <a:endParaRPr lang="en-US" dirty="0"/>
+          </a:p>
+        </p:txBody>
+      </p:sp>
+    </p:spTree>
+    <p:extLst>
+      <p:ext uri="{BB962C8B-B14F-4D97-AF65-F5344CB8AC3E}">
+        <p14:creationId xmlns:p14="http://schemas.microsoft.com/office/powerpoint/2010/main" val="3577539451"/>
       </p:ext>
     </p:extLst>
   </p:cSld>

</xml_diff>

<commit_message>
added bried pca to sandbox, other edits
</commit_message>
<xml_diff>
--- a/Outline.pptx
+++ b/Outline.pptx
@@ -6794,8 +6794,8 @@
         </p:nvSpPr>
         <p:spPr>
           <a:xfrm>
-            <a:off x="270934" y="1574799"/>
-            <a:ext cx="2565400" cy="829733"/>
+            <a:off x="270934" y="2003424"/>
+            <a:ext cx="2671232" cy="829733"/>
           </a:xfrm>
           <a:prstGeom prst="roundRect">
             <a:avLst/>
@@ -6841,7 +6841,7 @@
             </a:r>
             <a:r>
               <a:rPr lang="en-US" dirty="0" err="1" smtClean="0"/>
-              <a:t>hist_comment_lengths</a:t>
+              <a:t>plot_comment_lengths</a:t>
             </a:r>
             <a:r>
               <a:rPr lang="en-US" dirty="0" smtClean="0"/>
@@ -6859,8 +6859,8 @@
         </p:nvSpPr>
         <p:spPr>
           <a:xfrm>
-            <a:off x="2904067" y="1574800"/>
-            <a:ext cx="812800" cy="369332"/>
+            <a:off x="2904066" y="2012950"/>
+            <a:ext cx="3953933" cy="646331"/>
           </a:xfrm>
           <a:prstGeom prst="rect">
             <a:avLst/>
@@ -6875,7 +6875,7 @@
           <a:p>
             <a:r>
               <a:rPr lang="en-US" dirty="0" smtClean="0"/>
-              <a:t>In [5]</a:t>
+              <a:t>Show a histogram of the comment’s lengths </a:t>
             </a:r>
             <a:endParaRPr lang="en-US" dirty="0"/>
           </a:p>
@@ -6889,8 +6889,8 @@
         </p:nvSpPr>
         <p:spPr>
           <a:xfrm>
-            <a:off x="376766" y="2624665"/>
-            <a:ext cx="2565400" cy="829733"/>
+            <a:off x="270934" y="3053290"/>
+            <a:ext cx="2671232" cy="829733"/>
           </a:xfrm>
           <a:prstGeom prst="roundRect">
             <a:avLst/>
@@ -6936,7 +6936,7 @@
             </a:r>
             <a:r>
               <a:rPr lang="en-US" dirty="0" err="1" smtClean="0"/>
-              <a:t>clean_vs_toxic_ratio</a:t>
+              <a:t>plot_labels</a:t>
             </a:r>
             <a:r>
               <a:rPr lang="en-US" dirty="0" smtClean="0"/>
@@ -6954,8 +6954,8 @@
         </p:nvSpPr>
         <p:spPr>
           <a:xfrm>
-            <a:off x="2942166" y="2624665"/>
-            <a:ext cx="812800" cy="369332"/>
+            <a:off x="2942165" y="3053290"/>
+            <a:ext cx="3353859" cy="646331"/>
           </a:xfrm>
           <a:prstGeom prst="rect">
             <a:avLst/>
@@ -6970,7 +6970,15 @@
           <a:p>
             <a:r>
               <a:rPr lang="en-US" dirty="0" smtClean="0"/>
-              <a:t>In [6]</a:t>
+              <a:t>Show a bar plot of the counts of ‘</a:t>
+            </a:r>
+            <a:r>
+              <a:rPr lang="en-US" dirty="0" err="1" smtClean="0"/>
+              <a:t>overall_toxic</a:t>
+            </a:r>
+            <a:r>
+              <a:rPr lang="en-US" dirty="0" smtClean="0"/>
+              <a:t>’ and ‘non-toxic’ </a:t>
             </a:r>
             <a:endParaRPr lang="en-US" dirty="0"/>
           </a:p>
@@ -6978,79 +6986,14 @@
       </p:sp>
       <p:sp>
         <p:nvSpPr>
-          <p:cNvPr id="9" name="Rounded Rectangle 8"/>
-          <p:cNvSpPr/>
-          <p:nvPr/>
-        </p:nvSpPr>
-        <p:spPr>
-          <a:xfrm>
-            <a:off x="376766" y="3674530"/>
-            <a:ext cx="2565400" cy="829733"/>
-          </a:xfrm>
-          <a:prstGeom prst="roundRect">
-            <a:avLst/>
-          </a:prstGeom>
-          <a:solidFill>
-            <a:schemeClr val="bg1">
-              <a:lumMod val="65000"/>
-            </a:schemeClr>
-          </a:solidFill>
-        </p:spPr>
-        <p:style>
-          <a:lnRef idx="2">
-            <a:schemeClr val="accent1">
-              <a:shade val="50000"/>
-            </a:schemeClr>
-          </a:lnRef>
-          <a:fillRef idx="1">
-            <a:schemeClr val="accent1"/>
-          </a:fillRef>
-          <a:effectRef idx="0">
-            <a:schemeClr val="accent1"/>
-          </a:effectRef>
-          <a:fontRef idx="minor">
-            <a:schemeClr val="lt1"/>
-          </a:fontRef>
-        </p:style>
-        <p:txBody>
-          <a:bodyPr rtlCol="0" anchor="ctr"/>
-          <a:lstStyle/>
-          <a:p>
-            <a:pPr algn="ctr"/>
-            <a:r>
-              <a:rPr lang="en-US" dirty="0" err="1"/>
-              <a:t>d</a:t>
-            </a:r>
-            <a:r>
-              <a:rPr lang="en-US" dirty="0" err="1" smtClean="0"/>
-              <a:t>ef</a:t>
-            </a:r>
-            <a:r>
-              <a:rPr lang="en-US" dirty="0" smtClean="0"/>
-              <a:t> </a:t>
-            </a:r>
-            <a:r>
-              <a:rPr lang="en-US" dirty="0" err="1" smtClean="0"/>
-              <a:t>plot_comment_classes</a:t>
-            </a:r>
-            <a:r>
-              <a:rPr lang="en-US" dirty="0" smtClean="0"/>
-              <a:t>()</a:t>
-            </a:r>
-            <a:endParaRPr lang="en-US" dirty="0"/>
-          </a:p>
-        </p:txBody>
-      </p:sp>
-      <p:sp>
-        <p:nvSpPr>
-          <p:cNvPr id="11" name="TextBox 10"/>
+          <p:cNvPr id="14" name="TextBox 13"/>
           <p:cNvSpPr txBox="1"/>
           <p:nvPr/>
         </p:nvSpPr>
         <p:spPr>
           <a:xfrm>
-            <a:off x="2946399" y="3674527"/>
-            <a:ext cx="812800" cy="369332"/>
+            <a:off x="270934" y="1465946"/>
+            <a:ext cx="4729691" cy="369332"/>
           </a:xfrm>
           <a:prstGeom prst="rect">
             <a:avLst/>
@@ -7065,102 +7008,7 @@
           <a:p>
             <a:r>
               <a:rPr lang="en-US" dirty="0" smtClean="0"/>
-              <a:t>In [7]</a:t>
-            </a:r>
-            <a:endParaRPr lang="en-US" dirty="0"/>
-          </a:p>
-        </p:txBody>
-      </p:sp>
-      <p:sp>
-        <p:nvSpPr>
-          <p:cNvPr id="12" name="Rounded Rectangle 11"/>
-          <p:cNvSpPr/>
-          <p:nvPr/>
-        </p:nvSpPr>
-        <p:spPr>
-          <a:xfrm>
-            <a:off x="376766" y="4724389"/>
-            <a:ext cx="2565400" cy="829733"/>
-          </a:xfrm>
-          <a:prstGeom prst="roundRect">
-            <a:avLst/>
-          </a:prstGeom>
-          <a:solidFill>
-            <a:schemeClr val="bg1">
-              <a:lumMod val="65000"/>
-            </a:schemeClr>
-          </a:solidFill>
-        </p:spPr>
-        <p:style>
-          <a:lnRef idx="2">
-            <a:schemeClr val="accent1">
-              <a:shade val="50000"/>
-            </a:schemeClr>
-          </a:lnRef>
-          <a:fillRef idx="1">
-            <a:schemeClr val="accent1"/>
-          </a:fillRef>
-          <a:effectRef idx="0">
-            <a:schemeClr val="accent1"/>
-          </a:effectRef>
-          <a:fontRef idx="minor">
-            <a:schemeClr val="lt1"/>
-          </a:fontRef>
-        </p:style>
-        <p:txBody>
-          <a:bodyPr rtlCol="0" anchor="ctr"/>
-          <a:lstStyle/>
-          <a:p>
-            <a:pPr algn="ctr"/>
-            <a:r>
-              <a:rPr lang="en-US" dirty="0" err="1"/>
-              <a:t>d</a:t>
-            </a:r>
-            <a:r>
-              <a:rPr lang="en-US" dirty="0" err="1" smtClean="0"/>
-              <a:t>ef</a:t>
-            </a:r>
-            <a:r>
-              <a:rPr lang="en-US" dirty="0" smtClean="0"/>
-              <a:t> </a:t>
-            </a:r>
-            <a:r>
-              <a:rPr lang="en-US" dirty="0" err="1" smtClean="0"/>
-              <a:t>plot_multiple_classes</a:t>
-            </a:r>
-            <a:r>
-              <a:rPr lang="en-US" dirty="0" smtClean="0"/>
-              <a:t>()</a:t>
-            </a:r>
-            <a:endParaRPr lang="en-US" dirty="0"/>
-          </a:p>
-        </p:txBody>
-      </p:sp>
-      <p:sp>
-        <p:nvSpPr>
-          <p:cNvPr id="13" name="TextBox 12"/>
-          <p:cNvSpPr txBox="1"/>
-          <p:nvPr/>
-        </p:nvSpPr>
-        <p:spPr>
-          <a:xfrm>
-            <a:off x="2912534" y="4700597"/>
-            <a:ext cx="812800" cy="369332"/>
-          </a:xfrm>
-          <a:prstGeom prst="rect">
-            <a:avLst/>
-          </a:prstGeom>
-          <a:noFill/>
-        </p:spPr>
-        <p:txBody>
-          <a:bodyPr wrap="square" rtlCol="0">
-            <a:spAutoFit/>
-          </a:bodyPr>
-          <a:lstStyle/>
-          <a:p>
-            <a:r>
-              <a:rPr lang="en-US" dirty="0" smtClean="0"/>
-              <a:t>In [8]</a:t>
+              <a:t>Basic data frame visuals for train and test sets</a:t>
             </a:r>
             <a:endParaRPr lang="en-US" dirty="0"/>
           </a:p>

</xml_diff>